<commit_message>
added appln of dfs
</commit_message>
<xml_diff>
--- a/COLLEGE/DAA LAB/dfs.pptx
+++ b/COLLEGE/DAA LAB/dfs.pptx
@@ -5,7 +5,7 @@
     <p:sldMasterId id="2147483726" r:id="rId1"/>
   </p:sldMasterIdLst>
   <p:notesMasterIdLst>
-    <p:notesMasterId r:id="rId15"/>
+    <p:notesMasterId r:id="rId16"/>
   </p:notesMasterIdLst>
   <p:sldIdLst>
     <p:sldId id="256" r:id="rId2"/>
@@ -20,7 +20,8 @@
     <p:sldId id="276" r:id="rId11"/>
     <p:sldId id="279" r:id="rId12"/>
     <p:sldId id="280" r:id="rId13"/>
-    <p:sldId id="308" r:id="rId14"/>
+    <p:sldId id="309" r:id="rId14"/>
+    <p:sldId id="308" r:id="rId15"/>
   </p:sldIdLst>
   <p:sldSz cx="12192000" cy="6858000"/>
   <p:notesSz cx="9144000" cy="6858000"/>
@@ -220,7 +221,7 @@
           <a:p>
             <a:fld id="{1D9233EC-82C4-415C-8973-824F261E35BB}" type="datetimeFigureOut">
               <a:rPr lang="en-IN" smtClean="0"/>
-              <a:t>30-05-2020</a:t>
+              <a:t>08-06-2020</a:t>
             </a:fld>
             <a:endParaRPr lang="en-IN"/>
           </a:p>
@@ -732,7 +733,7 @@
           <a:p>
             <a:fld id="{1D8BD707-D9CF-40AE-B4C6-C98DA3205C09}" type="datetimeFigureOut">
               <a:rPr lang="en-US" smtClean="0"/>
-              <a:t>5/30/2020</a:t>
+              <a:t>6/8/2020</a:t>
             </a:fld>
             <a:endParaRPr lang="en-US"/>
           </a:p>
@@ -902,7 +903,7 @@
           <a:p>
             <a:fld id="{1D8BD707-D9CF-40AE-B4C6-C98DA3205C09}" type="datetimeFigureOut">
               <a:rPr lang="en-US" smtClean="0"/>
-              <a:t>5/30/2020</a:t>
+              <a:t>6/8/2020</a:t>
             </a:fld>
             <a:endParaRPr lang="en-US"/>
           </a:p>
@@ -1082,7 +1083,7 @@
           <a:p>
             <a:fld id="{1D8BD707-D9CF-40AE-B4C6-C98DA3205C09}" type="datetimeFigureOut">
               <a:rPr lang="en-US" smtClean="0"/>
-              <a:t>5/30/2020</a:t>
+              <a:t>6/8/2020</a:t>
             </a:fld>
             <a:endParaRPr lang="en-US"/>
           </a:p>
@@ -1252,7 +1253,7 @@
           <a:p>
             <a:fld id="{1D8BD707-D9CF-40AE-B4C6-C98DA3205C09}" type="datetimeFigureOut">
               <a:rPr lang="en-US" smtClean="0"/>
-              <a:t>5/30/2020</a:t>
+              <a:t>6/8/2020</a:t>
             </a:fld>
             <a:endParaRPr lang="en-US"/>
           </a:p>
@@ -1516,7 +1517,7 @@
           <a:p>
             <a:fld id="{1D8BD707-D9CF-40AE-B4C6-C98DA3205C09}" type="datetimeFigureOut">
               <a:rPr lang="en-US" smtClean="0"/>
-              <a:t>5/30/2020</a:t>
+              <a:t>6/8/2020</a:t>
             </a:fld>
             <a:endParaRPr lang="en-US"/>
           </a:p>
@@ -1804,7 +1805,7 @@
           <a:p>
             <a:fld id="{1D8BD707-D9CF-40AE-B4C6-C98DA3205C09}" type="datetimeFigureOut">
               <a:rPr lang="en-US" smtClean="0"/>
-              <a:t>5/30/2020</a:t>
+              <a:t>6/8/2020</a:t>
             </a:fld>
             <a:endParaRPr lang="en-US"/>
           </a:p>
@@ -2235,7 +2236,7 @@
           <a:p>
             <a:fld id="{1D8BD707-D9CF-40AE-B4C6-C98DA3205C09}" type="datetimeFigureOut">
               <a:rPr lang="en-US" smtClean="0"/>
-              <a:t>5/30/2020</a:t>
+              <a:t>6/8/2020</a:t>
             </a:fld>
             <a:endParaRPr lang="en-US"/>
           </a:p>
@@ -2353,7 +2354,7 @@
           <a:p>
             <a:fld id="{1D8BD707-D9CF-40AE-B4C6-C98DA3205C09}" type="datetimeFigureOut">
               <a:rPr lang="en-US" smtClean="0"/>
-              <a:t>5/30/2020</a:t>
+              <a:t>6/8/2020</a:t>
             </a:fld>
             <a:endParaRPr lang="en-US"/>
           </a:p>
@@ -2448,7 +2449,7 @@
           <a:p>
             <a:fld id="{1D8BD707-D9CF-40AE-B4C6-C98DA3205C09}" type="datetimeFigureOut">
               <a:rPr lang="en-US" smtClean="0"/>
-              <a:t>5/30/2020</a:t>
+              <a:t>6/8/2020</a:t>
             </a:fld>
             <a:endParaRPr lang="en-US"/>
           </a:p>
@@ -2812,7 +2813,7 @@
           <a:p>
             <a:fld id="{1D8BD707-D9CF-40AE-B4C6-C98DA3205C09}" type="datetimeFigureOut">
               <a:rPr lang="en-US" smtClean="0"/>
-              <a:t>5/30/2020</a:t>
+              <a:t>6/8/2020</a:t>
             </a:fld>
             <a:endParaRPr lang="en-US"/>
           </a:p>
@@ -3112,7 +3113,7 @@
           <a:p>
             <a:fld id="{1D8BD707-D9CF-40AE-B4C6-C98DA3205C09}" type="datetimeFigureOut">
               <a:rPr lang="en-US" smtClean="0"/>
-              <a:t>5/30/2020</a:t>
+              <a:t>6/8/2020</a:t>
             </a:fld>
             <a:endParaRPr lang="en-US"/>
           </a:p>
@@ -3325,7 +3326,7 @@
           <a:p>
             <a:fld id="{1D8BD707-D9CF-40AE-B4C6-C98DA3205C09}" type="datetimeFigureOut">
               <a:rPr lang="en-US" smtClean="0"/>
-              <a:t>5/30/2020</a:t>
+              <a:t>6/8/2020</a:t>
             </a:fld>
             <a:endParaRPr lang="en-US"/>
           </a:p>
@@ -3860,7 +3861,7 @@
                   <a:schemeClr val="tx2"/>
                 </a:solidFill>
               </a:rPr>
-              <a:t>      Name:  Deepak Jaiswal</a:t>
+              <a:t>      NAME:  DEEPAK JAISWAL</a:t>
             </a:r>
             <a:endParaRPr lang="en-IN" sz="2000" i="1" dirty="0">
               <a:solidFill>
@@ -14909,7 +14910,7 @@
               </a:rPr>
               <a:t>0</a:t>
             </a:r>
-            <a:endParaRPr sz="2400">
+            <a:endParaRPr sz="2400" dirty="0">
               <a:latin typeface="Times New Roman"/>
               <a:cs typeface="Times New Roman"/>
             </a:endParaRPr>
@@ -18003,6 +18004,277 @@
       </p:grpSpPr>
       <p:sp>
         <p:nvSpPr>
+          <p:cNvPr id="44" name="object 44"/>
+          <p:cNvSpPr/>
+          <p:nvPr/>
+        </p:nvSpPr>
+        <p:spPr>
+          <a:xfrm>
+            <a:off x="5334000" y="2209800"/>
+            <a:ext cx="0" cy="0"/>
+          </a:xfrm>
+          <a:custGeom>
+            <a:avLst/>
+            <a:gdLst/>
+            <a:ahLst/>
+            <a:cxnLst/>
+            <a:rect l="l" t="t" r="r" b="b"/>
+            <a:pathLst>
+              <a:path>
+                <a:moveTo>
+                  <a:pt x="0" y="0"/>
+                </a:moveTo>
+                <a:lnTo>
+                  <a:pt x="0" y="0"/>
+                </a:lnTo>
+              </a:path>
+            </a:pathLst>
+          </a:custGeom>
+          <a:ln w="9344">
+            <a:solidFill>
+              <a:srgbClr val="FFFFFF"/>
+            </a:solidFill>
+          </a:ln>
+        </p:spPr>
+        <p:txBody>
+          <a:bodyPr wrap="square" lIns="0" tIns="0" rIns="0" bIns="0" rtlCol="0"/>
+          <a:lstStyle/>
+          <a:p>
+            <a:endParaRPr/>
+          </a:p>
+        </p:txBody>
+      </p:sp>
+      <p:sp>
+        <p:nvSpPr>
+          <p:cNvPr id="59" name="object 59"/>
+          <p:cNvSpPr/>
+          <p:nvPr/>
+        </p:nvSpPr>
+        <p:spPr>
+          <a:xfrm>
+            <a:off x="6858000" y="2362200"/>
+            <a:ext cx="0" cy="0"/>
+          </a:xfrm>
+          <a:custGeom>
+            <a:avLst/>
+            <a:gdLst/>
+            <a:ahLst/>
+            <a:cxnLst/>
+            <a:rect l="l" t="t" r="r" b="b"/>
+            <a:pathLst>
+              <a:path>
+                <a:moveTo>
+                  <a:pt x="0" y="0"/>
+                </a:moveTo>
+                <a:lnTo>
+                  <a:pt x="0" y="0"/>
+                </a:lnTo>
+              </a:path>
+            </a:pathLst>
+          </a:custGeom>
+          <a:ln w="9344">
+            <a:solidFill>
+              <a:srgbClr val="FFFFFF"/>
+            </a:solidFill>
+          </a:ln>
+        </p:spPr>
+        <p:txBody>
+          <a:bodyPr wrap="square" lIns="0" tIns="0" rIns="0" bIns="0" rtlCol="0"/>
+          <a:lstStyle/>
+          <a:p>
+            <a:endParaRPr/>
+          </a:p>
+        </p:txBody>
+      </p:sp>
+      <p:sp>
+        <p:nvSpPr>
+          <p:cNvPr id="73" name="Title 72">
+            <a:extLst>
+              <a:ext uri="{FF2B5EF4-FFF2-40B4-BE49-F238E27FC236}">
+                <a16:creationId xmlns:a16="http://schemas.microsoft.com/office/drawing/2014/main" id="{C3D35627-996B-492A-BAC1-3F8AE7127ED8}"/>
+              </a:ext>
+            </a:extLst>
+          </p:cNvPr>
+          <p:cNvSpPr>
+            <a:spLocks noGrp="1"/>
+          </p:cNvSpPr>
+          <p:nvPr>
+            <p:ph type="title"/>
+          </p:nvPr>
+        </p:nvSpPr>
+        <p:spPr>
+          <a:xfrm>
+            <a:off x="304800" y="228600"/>
+            <a:ext cx="10772775" cy="1219201"/>
+          </a:xfrm>
+        </p:spPr>
+        <p:txBody>
+          <a:bodyPr/>
+          <a:lstStyle/>
+          <a:p>
+            <a:r>
+              <a:rPr lang="en-US" dirty="0">
+                <a:latin typeface="HP Simplified" panose="020B0604020204020204" pitchFamily="34" charset="0"/>
+              </a:rPr>
+              <a:t>Applications of Dfs Traversal:</a:t>
+            </a:r>
+            <a:endParaRPr lang="en-IN" dirty="0">
+              <a:latin typeface="HP Simplified" panose="020B0604020204020204" pitchFamily="34" charset="0"/>
+            </a:endParaRPr>
+          </a:p>
+        </p:txBody>
+      </p:sp>
+      <p:sp>
+        <p:nvSpPr>
+          <p:cNvPr id="74" name="Rectangle 73">
+            <a:extLst>
+              <a:ext uri="{FF2B5EF4-FFF2-40B4-BE49-F238E27FC236}">
+                <a16:creationId xmlns:a16="http://schemas.microsoft.com/office/drawing/2014/main" id="{87A685D5-9FD6-4895-A881-3A0807FFDD47}"/>
+              </a:ext>
+            </a:extLst>
+          </p:cNvPr>
+          <p:cNvSpPr/>
+          <p:nvPr/>
+        </p:nvSpPr>
+        <p:spPr>
+          <a:xfrm>
+            <a:off x="304800" y="1600200"/>
+            <a:ext cx="9982200" cy="4154984"/>
+          </a:xfrm>
+          <a:prstGeom prst="rect">
+            <a:avLst/>
+          </a:prstGeom>
+        </p:spPr>
+        <p:txBody>
+          <a:bodyPr wrap="square">
+            <a:spAutoFit/>
+          </a:bodyPr>
+          <a:lstStyle/>
+          <a:p>
+            <a:r>
+              <a:rPr lang="en-US" sz="2400" dirty="0">
+                <a:latin typeface="HP Simplified" panose="020B0604020204020204" pitchFamily="34" charset="0"/>
+              </a:rPr>
+              <a:t> </a:t>
+            </a:r>
+            <a:r>
+              <a:rPr lang="en-US" sz="2400" dirty="0">
+                <a:latin typeface="HP Simplified" panose="020B0604020204020204" pitchFamily="34" charset="0"/>
+                <a:cs typeface="Arial" panose="020B0604020202020204" pitchFamily="34" charset="0"/>
+              </a:rPr>
+              <a:t>1) For an unweighted graph, DFS traversal of the graph produces the minimum spanning tree.</a:t>
+            </a:r>
+          </a:p>
+          <a:p>
+            <a:endParaRPr lang="en-US" sz="2400" dirty="0">
+              <a:latin typeface="HP Simplified" panose="020B0604020204020204" pitchFamily="34" charset="0"/>
+            </a:endParaRPr>
+          </a:p>
+          <a:p>
+            <a:r>
+              <a:rPr lang="en-US" sz="2400" b="1" dirty="0">
+                <a:latin typeface="HP Simplified" panose="020B0604020204020204" pitchFamily="34" charset="0"/>
+              </a:rPr>
+              <a:t> </a:t>
+            </a:r>
+            <a:r>
+              <a:rPr lang="en-US" sz="2400" dirty="0">
+                <a:latin typeface="HP Simplified" panose="020B0604020204020204" pitchFamily="34" charset="0"/>
+                <a:cs typeface="Arial" panose="020B0604020202020204" pitchFamily="34" charset="0"/>
+              </a:rPr>
+              <a:t>2) DFS Traversal can be used for Detecting cycle in a graph</a:t>
+            </a:r>
+          </a:p>
+          <a:p>
+            <a:endParaRPr lang="en-US" sz="2400" b="1" i="0" dirty="0">
+              <a:effectLst/>
+              <a:latin typeface="HP Simplified" panose="020B0604020204020204" pitchFamily="34" charset="0"/>
+            </a:endParaRPr>
+          </a:p>
+          <a:p>
+            <a:r>
+              <a:rPr lang="en-IN" sz="2400" dirty="0">
+                <a:latin typeface="HP Simplified" panose="020B0604020204020204" pitchFamily="34" charset="0"/>
+                <a:cs typeface="Arial" panose="020B0604020202020204" pitchFamily="34" charset="0"/>
+              </a:rPr>
+              <a:t>3) DFS Traversal can be used for Topological Sorting.</a:t>
+            </a:r>
+          </a:p>
+          <a:p>
+            <a:pPr marL="457200" indent="-457200">
+              <a:buAutoNum type="arabicParenR" startAt="3"/>
+            </a:pPr>
+            <a:endParaRPr lang="en-US" sz="2400" b="1" i="0" dirty="0">
+              <a:effectLst/>
+              <a:latin typeface="HP Simplified" panose="020B0604020204020204" pitchFamily="34" charset="0"/>
+            </a:endParaRPr>
+          </a:p>
+          <a:p>
+            <a:r>
+              <a:rPr lang="en-US" sz="2400" dirty="0">
+                <a:latin typeface="HP Simplified" panose="020B0604020204020204" pitchFamily="34" charset="0"/>
+                <a:cs typeface="Arial" panose="020B0604020202020204" pitchFamily="34" charset="0"/>
+              </a:rPr>
+              <a:t>4) DFS Traversal can be used for Testing if a graph is Bipartite.</a:t>
+            </a:r>
+          </a:p>
+          <a:p>
+            <a:pPr marL="457200" indent="-457200">
+              <a:buAutoNum type="arabicParenR" startAt="3"/>
+            </a:pPr>
+            <a:endParaRPr lang="en-US" sz="2400" b="0" i="0" dirty="0">
+              <a:effectLst/>
+              <a:latin typeface="HP Simplified" panose="020B0604020204020204" pitchFamily="34" charset="0"/>
+            </a:endParaRPr>
+          </a:p>
+          <a:p>
+            <a:r>
+              <a:rPr lang="en-US" sz="2400" dirty="0">
+                <a:latin typeface="HP Simplified" panose="020B0604020204020204" pitchFamily="34" charset="0"/>
+                <a:cs typeface="Arial" panose="020B0604020202020204" pitchFamily="34" charset="0"/>
+              </a:rPr>
+              <a:t>5) DFS Traversal can be used for Finding Strongly Connected Components of a graph i.e. there is a path from each vertex in the graph.</a:t>
+            </a:r>
+            <a:endParaRPr lang="en-US" sz="2400" b="0" i="0" dirty="0">
+              <a:effectLst/>
+              <a:latin typeface="HP Simplified" panose="020B0604020204020204" pitchFamily="34" charset="0"/>
+              <a:cs typeface="Arial" panose="020B0604020202020204" pitchFamily="34" charset="0"/>
+            </a:endParaRPr>
+          </a:p>
+        </p:txBody>
+      </p:sp>
+    </p:spTree>
+    <p:extLst>
+      <p:ext uri="{BB962C8B-B14F-4D97-AF65-F5344CB8AC3E}">
+        <p14:creationId xmlns:p14="http://schemas.microsoft.com/office/powerpoint/2010/main" val="1551001750"/>
+      </p:ext>
+    </p:extLst>
+  </p:cSld>
+  <p:clrMapOvr>
+    <a:masterClrMapping/>
+  </p:clrMapOvr>
+</p:sld>
+</file>
+
+<file path=ppt/slides/slide14.xml><?xml version="1.0" encoding="utf-8"?>
+<p:sld xmlns:a="http://schemas.openxmlformats.org/drawingml/2006/main" xmlns:r="http://schemas.openxmlformats.org/officeDocument/2006/relationships" xmlns:p="http://schemas.openxmlformats.org/presentationml/2006/main">
+  <p:cSld>
+    <p:spTree>
+      <p:nvGrpSpPr>
+        <p:cNvPr id="1" name=""/>
+        <p:cNvGrpSpPr/>
+        <p:nvPr/>
+      </p:nvGrpSpPr>
+      <p:grpSpPr>
+        <a:xfrm>
+          <a:off x="0" y="0"/>
+          <a:ext cx="0" cy="0"/>
+          <a:chOff x="0" y="0"/>
+          <a:chExt cx="0" cy="0"/>
+        </a:xfrm>
+      </p:grpSpPr>
+      <p:sp>
+        <p:nvSpPr>
           <p:cNvPr id="4" name="Title 3">
             <a:extLst>
               <a:ext uri="{FF2B5EF4-FFF2-40B4-BE49-F238E27FC236}">
@@ -18331,6 +18603,16 @@
               <a:t>void </a:t>
             </a:r>
             <a:r>
+              <a:rPr sz="1600" spc="-5" dirty="0" err="1">
+                <a:solidFill>
+                  <a:srgbClr val="FFFFFF"/>
+                </a:solidFill>
+                <a:latin typeface="Arial"/>
+                <a:cs typeface="Arial"/>
+              </a:rPr>
+              <a:t>dfs</a:t>
+            </a:r>
+            <a:r>
               <a:rPr sz="1600" spc="-5" dirty="0">
                 <a:solidFill>
                   <a:srgbClr val="FFFFFF"/>
@@ -18338,7 +18620,7 @@
                 <a:latin typeface="Arial"/>
                 <a:cs typeface="Arial"/>
               </a:rPr>
-              <a:t>dfs (Node </a:t>
+              <a:t> (Node </a:t>
             </a:r>
             <a:r>
               <a:rPr sz="1600" dirty="0">
@@ -18971,7 +19253,7 @@
               <a:t>end </a:t>
             </a:r>
             <a:r>
-              <a:rPr sz="1600" spc="-5" dirty="0">
+              <a:rPr sz="1600" spc="-5" dirty="0" err="1">
                 <a:solidFill>
                   <a:srgbClr val="FFFFFF"/>
                 </a:solidFill>

</xml_diff>